<commit_message>
M0078DDG-336 trimmed white spaces in Shielded Plug diagrams
</commit_message>
<xml_diff>
--- a/PlatformDeveloperGuide/images/sp1.pptx
+++ b/PlatformDeveloperGuide/images/sp1.pptx
@@ -104,6 +104,11 @@
       </a:defRPr>
     </a:lvl9pPr>
   </p:defaultTextStyle>
+  <p:extLst>
+    <p:ext uri="{EFAFB233-063F-42B5-8137-9DF3F51BA10A}">
+      <p15:sldGuideLst xmlns:p15="http://schemas.microsoft.com/office/powerpoint/2012/main"/>
+    </p:ext>
+  </p:extLst>
 </p:presentation>
 </file>
 
@@ -256,7 +261,7 @@
           <a:p>
             <a:fld id="{7099DA68-A5A9-49AF-ACB5-907080CB2568}" type="datetimeFigureOut">
               <a:rPr lang="en-GB" smtClean="0"/>
-              <a:t>27/03/2020</a:t>
+              <a:t>12/10/2020</a:t>
             </a:fld>
             <a:endParaRPr lang="en-GB"/>
           </a:p>
@@ -456,7 +461,7 @@
           <a:p>
             <a:fld id="{7099DA68-A5A9-49AF-ACB5-907080CB2568}" type="datetimeFigureOut">
               <a:rPr lang="en-GB" smtClean="0"/>
-              <a:t>27/03/2020</a:t>
+              <a:t>12/10/2020</a:t>
             </a:fld>
             <a:endParaRPr lang="en-GB"/>
           </a:p>
@@ -666,7 +671,7 @@
           <a:p>
             <a:fld id="{7099DA68-A5A9-49AF-ACB5-907080CB2568}" type="datetimeFigureOut">
               <a:rPr lang="en-GB" smtClean="0"/>
-              <a:t>27/03/2020</a:t>
+              <a:t>12/10/2020</a:t>
             </a:fld>
             <a:endParaRPr lang="en-GB"/>
           </a:p>
@@ -866,7 +871,7 @@
           <a:p>
             <a:fld id="{7099DA68-A5A9-49AF-ACB5-907080CB2568}" type="datetimeFigureOut">
               <a:rPr lang="en-GB" smtClean="0"/>
-              <a:t>27/03/2020</a:t>
+              <a:t>12/10/2020</a:t>
             </a:fld>
             <a:endParaRPr lang="en-GB"/>
           </a:p>
@@ -1142,7 +1147,7 @@
           <a:p>
             <a:fld id="{7099DA68-A5A9-49AF-ACB5-907080CB2568}" type="datetimeFigureOut">
               <a:rPr lang="en-GB" smtClean="0"/>
-              <a:t>27/03/2020</a:t>
+              <a:t>12/10/2020</a:t>
             </a:fld>
             <a:endParaRPr lang="en-GB"/>
           </a:p>
@@ -1410,7 +1415,7 @@
           <a:p>
             <a:fld id="{7099DA68-A5A9-49AF-ACB5-907080CB2568}" type="datetimeFigureOut">
               <a:rPr lang="en-GB" smtClean="0"/>
-              <a:t>27/03/2020</a:t>
+              <a:t>12/10/2020</a:t>
             </a:fld>
             <a:endParaRPr lang="en-GB"/>
           </a:p>
@@ -1825,7 +1830,7 @@
           <a:p>
             <a:fld id="{7099DA68-A5A9-49AF-ACB5-907080CB2568}" type="datetimeFigureOut">
               <a:rPr lang="en-GB" smtClean="0"/>
-              <a:t>27/03/2020</a:t>
+              <a:t>12/10/2020</a:t>
             </a:fld>
             <a:endParaRPr lang="en-GB"/>
           </a:p>
@@ -1967,7 +1972,7 @@
           <a:p>
             <a:fld id="{7099DA68-A5A9-49AF-ACB5-907080CB2568}" type="datetimeFigureOut">
               <a:rPr lang="en-GB" smtClean="0"/>
-              <a:t>27/03/2020</a:t>
+              <a:t>12/10/2020</a:t>
             </a:fld>
             <a:endParaRPr lang="en-GB"/>
           </a:p>
@@ -2080,7 +2085,7 @@
           <a:p>
             <a:fld id="{7099DA68-A5A9-49AF-ACB5-907080CB2568}" type="datetimeFigureOut">
               <a:rPr lang="en-GB" smtClean="0"/>
-              <a:t>27/03/2020</a:t>
+              <a:t>12/10/2020</a:t>
             </a:fld>
             <a:endParaRPr lang="en-GB"/>
           </a:p>
@@ -2393,7 +2398,7 @@
           <a:p>
             <a:fld id="{7099DA68-A5A9-49AF-ACB5-907080CB2568}" type="datetimeFigureOut">
               <a:rPr lang="en-GB" smtClean="0"/>
-              <a:t>27/03/2020</a:t>
+              <a:t>12/10/2020</a:t>
             </a:fld>
             <a:endParaRPr lang="en-GB"/>
           </a:p>
@@ -2682,7 +2687,7 @@
           <a:p>
             <a:fld id="{7099DA68-A5A9-49AF-ACB5-907080CB2568}" type="datetimeFigureOut">
               <a:rPr lang="en-GB" smtClean="0"/>
-              <a:t>27/03/2020</a:t>
+              <a:t>12/10/2020</a:t>
             </a:fld>
             <a:endParaRPr lang="en-GB"/>
           </a:p>
@@ -2925,7 +2930,7 @@
           <a:p>
             <a:fld id="{7099DA68-A5A9-49AF-ACB5-907080CB2568}" type="datetimeFigureOut">
               <a:rPr lang="en-GB" smtClean="0"/>
-              <a:t>27/03/2020</a:t>
+              <a:t>12/10/2020</a:t>
             </a:fld>
             <a:endParaRPr lang="en-GB"/>
           </a:p>
@@ -3604,13 +3609,13 @@
               </a:ext>
             </a:extLst>
           </a:blip>
-          <a:srcRect t="-37477" b="37477"/>
+          <a:srcRect t="115" b="37477"/>
           <a:stretch/>
         </p:blipFill>
         <p:spPr>
           <a:xfrm>
-            <a:off x="3358330" y="1959359"/>
-            <a:ext cx="1152708" cy="1152708"/>
+            <a:off x="3358330" y="2392679"/>
+            <a:ext cx="1152708" cy="719387"/>
           </a:xfrm>
           <a:prstGeom prst="rect">
             <a:avLst/>
@@ -3639,13 +3644,13 @@
               </a:ext>
             </a:extLst>
           </a:blip>
-          <a:srcRect t="64611" b="-64611"/>
+          <a:srcRect t="64611" b="3509"/>
           <a:stretch/>
         </p:blipFill>
         <p:spPr>
           <a:xfrm>
-            <a:off x="3358330" y="3112067"/>
-            <a:ext cx="1152709" cy="1152709"/>
+            <a:off x="3358330" y="3112068"/>
+            <a:ext cx="1152709" cy="367482"/>
           </a:xfrm>
           <a:prstGeom prst="rect">
             <a:avLst/>

</xml_diff>